<commit_message>
added QStandardModel interface to the datamodel. Can now display the state heiarchy in a QTreeView widget.
</commit_message>
<xml_diff>
--- a/design.pptx
+++ b/design.pptx
@@ -5,11 +5,12 @@
     <p:sldMasterId id="2147483648" r:id="rId1"/>
   </p:sldMasterIdLst>
   <p:notesMasterIdLst>
-    <p:notesMasterId r:id="rId4"/>
+    <p:notesMasterId r:id="rId5"/>
   </p:notesMasterIdLst>
   <p:sldIdLst>
     <p:sldId id="256" r:id="rId2"/>
     <p:sldId id="257" r:id="rId3"/>
+    <p:sldId id="258" r:id="rId4"/>
   </p:sldIdLst>
   <p:sldSz cx="9144000" cy="6858000" type="screen4x3"/>
   <p:notesSz cx="6858000" cy="9144000"/>
@@ -194,7 +195,7 @@
             <a:fld id="{46099343-F74B-4921-8C0D-6D66A8A83ABE}" type="datetimeFigureOut">
               <a:rPr lang="en-US" smtClean="0"/>
               <a:pPr/>
-              <a:t>2/5/2011</a:t>
+              <a:t>2/14/2011</a:t>
             </a:fld>
             <a:endParaRPr lang="en-US"/>
           </a:p>
@@ -624,6 +625,88 @@
 </p:notes>
 </file>
 
+<file path=ppt/notesSlides/notesSlide3.xml><?xml version="1.0" encoding="utf-8"?>
+<p:notes xmlns:a="http://schemas.openxmlformats.org/drawingml/2006/main" xmlns:r="http://schemas.openxmlformats.org/officeDocument/2006/relationships" xmlns:p="http://schemas.openxmlformats.org/presentationml/2006/main">
+  <p:cSld>
+    <p:spTree>
+      <p:nvGrpSpPr>
+        <p:cNvPr id="1" name=""/>
+        <p:cNvGrpSpPr/>
+        <p:nvPr/>
+      </p:nvGrpSpPr>
+      <p:grpSpPr>
+        <a:xfrm>
+          <a:off x="0" y="0"/>
+          <a:ext cx="0" cy="0"/>
+          <a:chOff x="0" y="0"/>
+          <a:chExt cx="0" cy="0"/>
+        </a:xfrm>
+      </p:grpSpPr>
+      <p:sp>
+        <p:nvSpPr>
+          <p:cNvPr id="2" name="Slide Image Placeholder 1"/>
+          <p:cNvSpPr>
+            <a:spLocks noGrp="1" noRot="1" noChangeAspect="1"/>
+          </p:cNvSpPr>
+          <p:nvPr>
+            <p:ph type="sldImg"/>
+          </p:nvPr>
+        </p:nvSpPr>
+        <p:spPr/>
+      </p:sp>
+      <p:sp>
+        <p:nvSpPr>
+          <p:cNvPr id="3" name="Notes Placeholder 2"/>
+          <p:cNvSpPr>
+            <a:spLocks noGrp="1"/>
+          </p:cNvSpPr>
+          <p:nvPr>
+            <p:ph type="body" idx="1"/>
+          </p:nvPr>
+        </p:nvSpPr>
+        <p:spPr/>
+        <p:txBody>
+          <a:bodyPr>
+            <a:normAutofit/>
+          </a:bodyPr>
+          <a:lstStyle/>
+          <a:p>
+            <a:endParaRPr lang="en-US"/>
+          </a:p>
+        </p:txBody>
+      </p:sp>
+      <p:sp>
+        <p:nvSpPr>
+          <p:cNvPr id="4" name="Slide Number Placeholder 3"/>
+          <p:cNvSpPr>
+            <a:spLocks noGrp="1"/>
+          </p:cNvSpPr>
+          <p:nvPr>
+            <p:ph type="sldNum" sz="quarter" idx="10"/>
+          </p:nvPr>
+        </p:nvSpPr>
+        <p:spPr/>
+        <p:txBody>
+          <a:bodyPr/>
+          <a:lstStyle/>
+          <a:p>
+            <a:fld id="{09921A35-120F-46A8-A816-452D9A47EEB7}" type="slidenum">
+              <a:rPr lang="en-US" smtClean="0"/>
+              <a:pPr/>
+              <a:t>3</a:t>
+            </a:fld>
+            <a:endParaRPr lang="en-US"/>
+          </a:p>
+        </p:txBody>
+      </p:sp>
+    </p:spTree>
+  </p:cSld>
+  <p:clrMapOvr>
+    <a:masterClrMapping/>
+  </p:clrMapOvr>
+</p:notes>
+</file>
+
 <file path=ppt/slideLayouts/slideLayout1.xml><?xml version="1.0" encoding="utf-8"?>
 <p:sldLayout xmlns:a="http://schemas.openxmlformats.org/drawingml/2006/main" xmlns:r="http://schemas.openxmlformats.org/officeDocument/2006/relationships" xmlns:p="http://schemas.openxmlformats.org/presentationml/2006/main" type="title" preserve="1">
   <p:cSld name="Title Slide">
@@ -806,7 +889,7 @@
             <a:fld id="{B4F70677-8E11-4514-95B0-FACEE0366784}" type="datetimeFigureOut">
               <a:rPr lang="en-US" smtClean="0"/>
               <a:pPr/>
-              <a:t>2/5/2011</a:t>
+              <a:t>2/14/2011</a:t>
             </a:fld>
             <a:endParaRPr lang="en-US"/>
           </a:p>
@@ -973,7 +1056,7 @@
             <a:fld id="{B4F70677-8E11-4514-95B0-FACEE0366784}" type="datetimeFigureOut">
               <a:rPr lang="en-US" smtClean="0"/>
               <a:pPr/>
-              <a:t>2/5/2011</a:t>
+              <a:t>2/14/2011</a:t>
             </a:fld>
             <a:endParaRPr lang="en-US"/>
           </a:p>
@@ -1150,7 +1233,7 @@
             <a:fld id="{B4F70677-8E11-4514-95B0-FACEE0366784}" type="datetimeFigureOut">
               <a:rPr lang="en-US" smtClean="0"/>
               <a:pPr/>
-              <a:t>2/5/2011</a:t>
+              <a:t>2/14/2011</a:t>
             </a:fld>
             <a:endParaRPr lang="en-US"/>
           </a:p>
@@ -1317,7 +1400,7 @@
             <a:fld id="{B4F70677-8E11-4514-95B0-FACEE0366784}" type="datetimeFigureOut">
               <a:rPr lang="en-US" smtClean="0"/>
               <a:pPr/>
-              <a:t>2/5/2011</a:t>
+              <a:t>2/14/2011</a:t>
             </a:fld>
             <a:endParaRPr lang="en-US"/>
           </a:p>
@@ -1560,7 +1643,7 @@
             <a:fld id="{B4F70677-8E11-4514-95B0-FACEE0366784}" type="datetimeFigureOut">
               <a:rPr lang="en-US" smtClean="0"/>
               <a:pPr/>
-              <a:t>2/5/2011</a:t>
+              <a:t>2/14/2011</a:t>
             </a:fld>
             <a:endParaRPr lang="en-US"/>
           </a:p>
@@ -1845,7 +1928,7 @@
             <a:fld id="{B4F70677-8E11-4514-95B0-FACEE0366784}" type="datetimeFigureOut">
               <a:rPr lang="en-US" smtClean="0"/>
               <a:pPr/>
-              <a:t>2/5/2011</a:t>
+              <a:t>2/14/2011</a:t>
             </a:fld>
             <a:endParaRPr lang="en-US"/>
           </a:p>
@@ -2264,7 +2347,7 @@
             <a:fld id="{B4F70677-8E11-4514-95B0-FACEE0366784}" type="datetimeFigureOut">
               <a:rPr lang="en-US" smtClean="0"/>
               <a:pPr/>
-              <a:t>2/5/2011</a:t>
+              <a:t>2/14/2011</a:t>
             </a:fld>
             <a:endParaRPr lang="en-US"/>
           </a:p>
@@ -2379,7 +2462,7 @@
             <a:fld id="{B4F70677-8E11-4514-95B0-FACEE0366784}" type="datetimeFigureOut">
               <a:rPr lang="en-US" smtClean="0"/>
               <a:pPr/>
-              <a:t>2/5/2011</a:t>
+              <a:t>2/14/2011</a:t>
             </a:fld>
             <a:endParaRPr lang="en-US"/>
           </a:p>
@@ -2471,7 +2554,7 @@
             <a:fld id="{B4F70677-8E11-4514-95B0-FACEE0366784}" type="datetimeFigureOut">
               <a:rPr lang="en-US" smtClean="0"/>
               <a:pPr/>
-              <a:t>2/5/2011</a:t>
+              <a:t>2/14/2011</a:t>
             </a:fld>
             <a:endParaRPr lang="en-US"/>
           </a:p>
@@ -2745,7 +2828,7 @@
             <a:fld id="{B4F70677-8E11-4514-95B0-FACEE0366784}" type="datetimeFigureOut">
               <a:rPr lang="en-US" smtClean="0"/>
               <a:pPr/>
-              <a:t>2/5/2011</a:t>
+              <a:t>2/14/2011</a:t>
             </a:fld>
             <a:endParaRPr lang="en-US"/>
           </a:p>
@@ -2995,7 +3078,7 @@
             <a:fld id="{B4F70677-8E11-4514-95B0-FACEE0366784}" type="datetimeFigureOut">
               <a:rPr lang="en-US" smtClean="0"/>
               <a:pPr/>
-              <a:t>2/5/2011</a:t>
+              <a:t>2/14/2011</a:t>
             </a:fld>
             <a:endParaRPr lang="en-US"/>
           </a:p>
@@ -3205,7 +3288,7 @@
             <a:fld id="{B4F70677-8E11-4514-95B0-FACEE0366784}" type="datetimeFigureOut">
               <a:rPr lang="en-US" smtClean="0"/>
               <a:pPr/>
-              <a:t>2/5/2011</a:t>
+              <a:t>2/14/2011</a:t>
             </a:fld>
             <a:endParaRPr lang="en-US"/>
           </a:p>
@@ -6000,6 +6083,729 @@
 </p:sld>
 </file>
 
+<file path=ppt/slides/slide3.xml><?xml version="1.0" encoding="utf-8"?>
+<p:sld xmlns:a="http://schemas.openxmlformats.org/drawingml/2006/main" xmlns:r="http://schemas.openxmlformats.org/officeDocument/2006/relationships" xmlns:p="http://schemas.openxmlformats.org/presentationml/2006/main">
+  <p:cSld>
+    <p:spTree>
+      <p:nvGrpSpPr>
+        <p:cNvPr id="1" name=""/>
+        <p:cNvGrpSpPr/>
+        <p:nvPr/>
+      </p:nvGrpSpPr>
+      <p:grpSpPr>
+        <a:xfrm>
+          <a:off x="0" y="0"/>
+          <a:ext cx="0" cy="0"/>
+          <a:chOff x="0" y="0"/>
+          <a:chExt cx="0" cy="0"/>
+        </a:xfrm>
+      </p:grpSpPr>
+      <p:sp>
+        <p:nvSpPr>
+          <p:cNvPr id="2" name="Rectangle 1"/>
+          <p:cNvSpPr/>
+          <p:nvPr/>
+        </p:nvSpPr>
+        <p:spPr>
+          <a:xfrm>
+            <a:off x="1600200" y="762000"/>
+            <a:ext cx="1066800" cy="304800"/>
+          </a:xfrm>
+          <a:prstGeom prst="rect">
+            <a:avLst/>
+          </a:prstGeom>
+          <a:gradFill>
+            <a:gsLst>
+              <a:gs pos="0">
+                <a:srgbClr val="DDEBCF">
+                  <a:alpha val="53000"/>
+                </a:srgbClr>
+              </a:gs>
+              <a:gs pos="50000">
+                <a:srgbClr val="9CB86E"/>
+              </a:gs>
+              <a:gs pos="100000">
+                <a:srgbClr val="156B13"/>
+              </a:gs>
+            </a:gsLst>
+            <a:lin ang="5400000" scaled="0"/>
+          </a:gradFill>
+          <a:ln w="6350"/>
+        </p:spPr>
+        <p:style>
+          <a:lnRef idx="2">
+            <a:schemeClr val="accent1">
+              <a:shade val="50000"/>
+            </a:schemeClr>
+          </a:lnRef>
+          <a:fillRef idx="1">
+            <a:schemeClr val="accent1"/>
+          </a:fillRef>
+          <a:effectRef idx="0">
+            <a:schemeClr val="accent1"/>
+          </a:effectRef>
+          <a:fontRef idx="minor">
+            <a:schemeClr val="lt1"/>
+          </a:fontRef>
+        </p:style>
+        <p:txBody>
+          <a:bodyPr rtlCol="0" anchor="ctr"/>
+          <a:lstStyle/>
+          <a:p>
+            <a:pPr algn="ctr"/>
+            <a:endParaRPr lang="en-US"/>
+          </a:p>
+        </p:txBody>
+      </p:sp>
+      <p:sp>
+        <p:nvSpPr>
+          <p:cNvPr id="3" name="Rectangle 2"/>
+          <p:cNvSpPr/>
+          <p:nvPr/>
+        </p:nvSpPr>
+        <p:spPr>
+          <a:xfrm>
+            <a:off x="1600200" y="1066800"/>
+            <a:ext cx="533400" cy="228600"/>
+          </a:xfrm>
+          <a:prstGeom prst="rect">
+            <a:avLst/>
+          </a:prstGeom>
+          <a:gradFill>
+            <a:gsLst>
+              <a:gs pos="0">
+                <a:srgbClr val="DDEBCF">
+                  <a:alpha val="53000"/>
+                </a:srgbClr>
+              </a:gs>
+              <a:gs pos="50000">
+                <a:srgbClr val="9CB86E"/>
+              </a:gs>
+              <a:gs pos="100000">
+                <a:srgbClr val="156B13"/>
+              </a:gs>
+            </a:gsLst>
+            <a:lin ang="5400000" scaled="0"/>
+          </a:gradFill>
+          <a:ln w="6350"/>
+        </p:spPr>
+        <p:style>
+          <a:lnRef idx="2">
+            <a:schemeClr val="accent1">
+              <a:shade val="50000"/>
+            </a:schemeClr>
+          </a:lnRef>
+          <a:fillRef idx="1">
+            <a:schemeClr val="accent1"/>
+          </a:fillRef>
+          <a:effectRef idx="0">
+            <a:schemeClr val="accent1"/>
+          </a:effectRef>
+          <a:fontRef idx="minor">
+            <a:schemeClr val="lt1"/>
+          </a:fontRef>
+        </p:style>
+        <p:txBody>
+          <a:bodyPr rtlCol="0" anchor="ctr"/>
+          <a:lstStyle/>
+          <a:p>
+            <a:pPr algn="ctr"/>
+            <a:endParaRPr lang="en-US"/>
+          </a:p>
+        </p:txBody>
+      </p:sp>
+      <p:sp>
+        <p:nvSpPr>
+          <p:cNvPr id="4" name="Rectangle 3"/>
+          <p:cNvSpPr/>
+          <p:nvPr/>
+        </p:nvSpPr>
+        <p:spPr>
+          <a:xfrm>
+            <a:off x="2133600" y="1066800"/>
+            <a:ext cx="533400" cy="228600"/>
+          </a:xfrm>
+          <a:prstGeom prst="rect">
+            <a:avLst/>
+          </a:prstGeom>
+          <a:gradFill>
+            <a:gsLst>
+              <a:gs pos="0">
+                <a:srgbClr val="DDEBCF">
+                  <a:alpha val="53000"/>
+                </a:srgbClr>
+              </a:gs>
+              <a:gs pos="50000">
+                <a:srgbClr val="9CB86E"/>
+              </a:gs>
+              <a:gs pos="100000">
+                <a:srgbClr val="156B13"/>
+              </a:gs>
+            </a:gsLst>
+            <a:lin ang="5400000" scaled="0"/>
+          </a:gradFill>
+          <a:ln w="6350"/>
+        </p:spPr>
+        <p:style>
+          <a:lnRef idx="2">
+            <a:schemeClr val="accent1">
+              <a:shade val="50000"/>
+            </a:schemeClr>
+          </a:lnRef>
+          <a:fillRef idx="1">
+            <a:schemeClr val="accent1"/>
+          </a:fillRef>
+          <a:effectRef idx="0">
+            <a:schemeClr val="accent1"/>
+          </a:effectRef>
+          <a:fontRef idx="minor">
+            <a:schemeClr val="lt1"/>
+          </a:fontRef>
+        </p:style>
+        <p:txBody>
+          <a:bodyPr rtlCol="0" anchor="ctr"/>
+          <a:lstStyle/>
+          <a:p>
+            <a:pPr algn="ctr"/>
+            <a:endParaRPr lang="en-US"/>
+          </a:p>
+        </p:txBody>
+      </p:sp>
+      <p:cxnSp>
+        <p:nvCxnSpPr>
+          <p:cNvPr id="6" name="Straight Arrow Connector 5"/>
+          <p:cNvCxnSpPr/>
+          <p:nvPr/>
+        </p:nvCxnSpPr>
+        <p:spPr>
+          <a:xfrm>
+            <a:off x="1981200" y="914400"/>
+            <a:ext cx="304800" cy="1588"/>
+          </a:xfrm>
+          <a:prstGeom prst="straightConnector1">
+            <a:avLst/>
+          </a:prstGeom>
+          <a:ln w="34925">
+            <a:solidFill>
+              <a:srgbClr val="FF0000"/>
+            </a:solidFill>
+            <a:tailEnd type="arrow"/>
+          </a:ln>
+        </p:spPr>
+        <p:style>
+          <a:lnRef idx="1">
+            <a:schemeClr val="accent1"/>
+          </a:lnRef>
+          <a:fillRef idx="0">
+            <a:schemeClr val="accent1"/>
+          </a:fillRef>
+          <a:effectRef idx="0">
+            <a:schemeClr val="accent1"/>
+          </a:effectRef>
+          <a:fontRef idx="minor">
+            <a:schemeClr val="tx1"/>
+          </a:fontRef>
+        </p:style>
+      </p:cxnSp>
+      <p:sp>
+        <p:nvSpPr>
+          <p:cNvPr id="7" name="Plus 6"/>
+          <p:cNvSpPr/>
+          <p:nvPr/>
+        </p:nvSpPr>
+        <p:spPr>
+          <a:xfrm>
+            <a:off x="2057400" y="1676400"/>
+            <a:ext cx="228600" cy="228600"/>
+          </a:xfrm>
+          <a:prstGeom prst="mathPlus">
+            <a:avLst/>
+          </a:prstGeom>
+          <a:solidFill>
+            <a:schemeClr val="accent2">
+              <a:lumMod val="75000"/>
+            </a:schemeClr>
+          </a:solidFill>
+          <a:ln>
+            <a:solidFill>
+              <a:schemeClr val="accent2">
+                <a:lumMod val="75000"/>
+              </a:schemeClr>
+            </a:solidFill>
+          </a:ln>
+        </p:spPr>
+        <p:style>
+          <a:lnRef idx="2">
+            <a:schemeClr val="accent1">
+              <a:shade val="50000"/>
+            </a:schemeClr>
+          </a:lnRef>
+          <a:fillRef idx="1">
+            <a:schemeClr val="accent1"/>
+          </a:fillRef>
+          <a:effectRef idx="0">
+            <a:schemeClr val="accent1"/>
+          </a:effectRef>
+          <a:fontRef idx="minor">
+            <a:schemeClr val="lt1"/>
+          </a:fontRef>
+        </p:style>
+        <p:txBody>
+          <a:bodyPr rtlCol="0" anchor="ctr"/>
+          <a:lstStyle/>
+          <a:p>
+            <a:pPr algn="ctr"/>
+            <a:endParaRPr lang="en-US"/>
+          </a:p>
+        </p:txBody>
+      </p:sp>
+      <p:sp>
+        <p:nvSpPr>
+          <p:cNvPr id="8" name="Minus 7"/>
+          <p:cNvSpPr/>
+          <p:nvPr/>
+        </p:nvSpPr>
+        <p:spPr>
+          <a:xfrm>
+            <a:off x="2286000" y="1143000"/>
+            <a:ext cx="228600" cy="76200"/>
+          </a:xfrm>
+          <a:prstGeom prst="mathMinus">
+            <a:avLst/>
+          </a:prstGeom>
+          <a:solidFill>
+            <a:srgbClr val="FF0000"/>
+          </a:solidFill>
+          <a:ln>
+            <a:solidFill>
+              <a:srgbClr val="FF0000"/>
+            </a:solidFill>
+          </a:ln>
+        </p:spPr>
+        <p:style>
+          <a:lnRef idx="2">
+            <a:schemeClr val="accent1">
+              <a:shade val="50000"/>
+            </a:schemeClr>
+          </a:lnRef>
+          <a:fillRef idx="1">
+            <a:schemeClr val="accent1"/>
+          </a:fillRef>
+          <a:effectRef idx="0">
+            <a:schemeClr val="accent1"/>
+          </a:effectRef>
+          <a:fontRef idx="minor">
+            <a:schemeClr val="lt1"/>
+          </a:fontRef>
+        </p:style>
+        <p:txBody>
+          <a:bodyPr rtlCol="0" anchor="ctr"/>
+          <a:lstStyle/>
+          <a:p>
+            <a:pPr algn="ctr"/>
+            <a:endParaRPr lang="en-US"/>
+          </a:p>
+        </p:txBody>
+      </p:sp>
+      <p:sp>
+        <p:nvSpPr>
+          <p:cNvPr id="9" name="TextBox 8"/>
+          <p:cNvSpPr txBox="1"/>
+          <p:nvPr/>
+        </p:nvSpPr>
+        <p:spPr>
+          <a:xfrm>
+            <a:off x="1676400" y="914400"/>
+            <a:ext cx="381000" cy="523220"/>
+          </a:xfrm>
+          <a:prstGeom prst="rect">
+            <a:avLst/>
+          </a:prstGeom>
+          <a:noFill/>
+        </p:spPr>
+        <p:txBody>
+          <a:bodyPr wrap="square" rtlCol="0">
+            <a:spAutoFit/>
+          </a:bodyPr>
+          <a:lstStyle/>
+          <a:p>
+            <a:r>
+              <a:rPr lang="en-US" sz="2800" b="1" dirty="0" smtClean="0">
+                <a:solidFill>
+                  <a:srgbClr val="FF0000"/>
+                </a:solidFill>
+              </a:rPr>
+              <a:t>+</a:t>
+            </a:r>
+            <a:endParaRPr lang="en-US" sz="1400" b="1" dirty="0">
+              <a:solidFill>
+                <a:srgbClr val="FF0000"/>
+              </a:solidFill>
+            </a:endParaRPr>
+          </a:p>
+        </p:txBody>
+      </p:sp>
+      <p:sp>
+        <p:nvSpPr>
+          <p:cNvPr id="10" name="Rectangle 9"/>
+          <p:cNvSpPr/>
+          <p:nvPr/>
+        </p:nvSpPr>
+        <p:spPr>
+          <a:xfrm>
+            <a:off x="3048000" y="762000"/>
+            <a:ext cx="1066800" cy="304800"/>
+          </a:xfrm>
+          <a:prstGeom prst="rect">
+            <a:avLst/>
+          </a:prstGeom>
+          <a:gradFill>
+            <a:gsLst>
+              <a:gs pos="0">
+                <a:srgbClr val="DDEBCF">
+                  <a:alpha val="53000"/>
+                </a:srgbClr>
+              </a:gs>
+              <a:gs pos="50000">
+                <a:srgbClr val="9CB86E"/>
+              </a:gs>
+              <a:gs pos="100000">
+                <a:srgbClr val="156B13"/>
+              </a:gs>
+            </a:gsLst>
+            <a:lin ang="5400000" scaled="0"/>
+          </a:gradFill>
+          <a:ln w="6350"/>
+        </p:spPr>
+        <p:style>
+          <a:lnRef idx="2">
+            <a:schemeClr val="accent1">
+              <a:shade val="50000"/>
+            </a:schemeClr>
+          </a:lnRef>
+          <a:fillRef idx="1">
+            <a:schemeClr val="accent1"/>
+          </a:fillRef>
+          <a:effectRef idx="0">
+            <a:schemeClr val="accent1"/>
+          </a:effectRef>
+          <a:fontRef idx="minor">
+            <a:schemeClr val="lt1"/>
+          </a:fontRef>
+        </p:style>
+        <p:txBody>
+          <a:bodyPr rtlCol="0" anchor="ctr"/>
+          <a:lstStyle/>
+          <a:p>
+            <a:pPr algn="ctr"/>
+            <a:endParaRPr lang="en-US"/>
+          </a:p>
+        </p:txBody>
+      </p:sp>
+      <p:sp>
+        <p:nvSpPr>
+          <p:cNvPr id="11" name="Rectangle 10"/>
+          <p:cNvSpPr/>
+          <p:nvPr/>
+        </p:nvSpPr>
+        <p:spPr>
+          <a:xfrm>
+            <a:off x="3048000" y="1066800"/>
+            <a:ext cx="533400" cy="228600"/>
+          </a:xfrm>
+          <a:prstGeom prst="rect">
+            <a:avLst/>
+          </a:prstGeom>
+          <a:gradFill>
+            <a:gsLst>
+              <a:gs pos="0">
+                <a:srgbClr val="DDEBCF">
+                  <a:alpha val="53000"/>
+                </a:srgbClr>
+              </a:gs>
+              <a:gs pos="50000">
+                <a:srgbClr val="9CB86E"/>
+              </a:gs>
+              <a:gs pos="100000">
+                <a:srgbClr val="156B13"/>
+              </a:gs>
+            </a:gsLst>
+            <a:lin ang="5400000" scaled="0"/>
+          </a:gradFill>
+          <a:ln w="6350"/>
+        </p:spPr>
+        <p:style>
+          <a:lnRef idx="2">
+            <a:schemeClr val="accent1">
+              <a:shade val="50000"/>
+            </a:schemeClr>
+          </a:lnRef>
+          <a:fillRef idx="1">
+            <a:schemeClr val="accent1"/>
+          </a:fillRef>
+          <a:effectRef idx="0">
+            <a:schemeClr val="accent1"/>
+          </a:effectRef>
+          <a:fontRef idx="minor">
+            <a:schemeClr val="lt1"/>
+          </a:fontRef>
+        </p:style>
+        <p:txBody>
+          <a:bodyPr rtlCol="0" anchor="ctr"/>
+          <a:lstStyle/>
+          <a:p>
+            <a:pPr algn="ctr"/>
+            <a:endParaRPr lang="en-US"/>
+          </a:p>
+        </p:txBody>
+      </p:sp>
+      <p:sp>
+        <p:nvSpPr>
+          <p:cNvPr id="12" name="Rectangle 11"/>
+          <p:cNvSpPr/>
+          <p:nvPr/>
+        </p:nvSpPr>
+        <p:spPr>
+          <a:xfrm>
+            <a:off x="3581400" y="1066800"/>
+            <a:ext cx="533400" cy="228600"/>
+          </a:xfrm>
+          <a:prstGeom prst="rect">
+            <a:avLst/>
+          </a:prstGeom>
+          <a:gradFill>
+            <a:gsLst>
+              <a:gs pos="0">
+                <a:srgbClr val="DDEBCF">
+                  <a:alpha val="53000"/>
+                </a:srgbClr>
+              </a:gs>
+              <a:gs pos="50000">
+                <a:srgbClr val="9CB86E"/>
+              </a:gs>
+              <a:gs pos="100000">
+                <a:srgbClr val="156B13"/>
+              </a:gs>
+            </a:gsLst>
+            <a:lin ang="5400000" scaled="0"/>
+          </a:gradFill>
+          <a:ln w="6350"/>
+        </p:spPr>
+        <p:style>
+          <a:lnRef idx="2">
+            <a:schemeClr val="accent1">
+              <a:shade val="50000"/>
+            </a:schemeClr>
+          </a:lnRef>
+          <a:fillRef idx="1">
+            <a:schemeClr val="accent1"/>
+          </a:fillRef>
+          <a:effectRef idx="0">
+            <a:schemeClr val="accent1"/>
+          </a:effectRef>
+          <a:fontRef idx="minor">
+            <a:schemeClr val="lt1"/>
+          </a:fontRef>
+        </p:style>
+        <p:txBody>
+          <a:bodyPr rtlCol="0" anchor="ctr"/>
+          <a:lstStyle/>
+          <a:p>
+            <a:pPr algn="ctr"/>
+            <a:endParaRPr lang="en-US"/>
+          </a:p>
+        </p:txBody>
+      </p:sp>
+      <p:sp>
+        <p:nvSpPr>
+          <p:cNvPr id="14" name="Minus 13"/>
+          <p:cNvSpPr/>
+          <p:nvPr/>
+        </p:nvSpPr>
+        <p:spPr>
+          <a:xfrm>
+            <a:off x="3733800" y="1143000"/>
+            <a:ext cx="228600" cy="76200"/>
+          </a:xfrm>
+          <a:prstGeom prst="mathMinus">
+            <a:avLst/>
+          </a:prstGeom>
+          <a:solidFill>
+            <a:srgbClr val="FF0000"/>
+          </a:solidFill>
+          <a:ln>
+            <a:solidFill>
+              <a:srgbClr val="FF0000"/>
+            </a:solidFill>
+          </a:ln>
+        </p:spPr>
+        <p:style>
+          <a:lnRef idx="2">
+            <a:schemeClr val="accent1">
+              <a:shade val="50000"/>
+            </a:schemeClr>
+          </a:lnRef>
+          <a:fillRef idx="1">
+            <a:schemeClr val="accent1"/>
+          </a:fillRef>
+          <a:effectRef idx="0">
+            <a:schemeClr val="accent1"/>
+          </a:effectRef>
+          <a:fontRef idx="minor">
+            <a:schemeClr val="lt1"/>
+          </a:fontRef>
+        </p:style>
+        <p:txBody>
+          <a:bodyPr rtlCol="0" anchor="ctr"/>
+          <a:lstStyle/>
+          <a:p>
+            <a:pPr algn="ctr"/>
+            <a:endParaRPr lang="en-US"/>
+          </a:p>
+        </p:txBody>
+      </p:sp>
+      <p:sp>
+        <p:nvSpPr>
+          <p:cNvPr id="15" name="TextBox 14"/>
+          <p:cNvSpPr txBox="1"/>
+          <p:nvPr/>
+        </p:nvSpPr>
+        <p:spPr>
+          <a:xfrm>
+            <a:off x="3124200" y="914400"/>
+            <a:ext cx="381000" cy="523220"/>
+          </a:xfrm>
+          <a:prstGeom prst="rect">
+            <a:avLst/>
+          </a:prstGeom>
+          <a:noFill/>
+        </p:spPr>
+        <p:txBody>
+          <a:bodyPr wrap="square" rtlCol="0">
+            <a:spAutoFit/>
+          </a:bodyPr>
+          <a:lstStyle/>
+          <a:p>
+            <a:r>
+              <a:rPr lang="en-US" sz="2800" b="1" dirty="0" smtClean="0">
+                <a:solidFill>
+                  <a:srgbClr val="FF0000"/>
+                </a:solidFill>
+              </a:rPr>
+              <a:t>+</a:t>
+            </a:r>
+            <a:endParaRPr lang="en-US" sz="1400" b="1" dirty="0">
+              <a:solidFill>
+                <a:srgbClr val="FF0000"/>
+              </a:solidFill>
+            </a:endParaRPr>
+          </a:p>
+        </p:txBody>
+      </p:sp>
+      <p:grpSp>
+        <p:nvGrpSpPr>
+          <p:cNvPr id="19" name="Group 18"/>
+          <p:cNvGrpSpPr/>
+          <p:nvPr/>
+        </p:nvGrpSpPr>
+        <p:grpSpPr>
+          <a:xfrm>
+            <a:off x="3376615" y="804867"/>
+            <a:ext cx="381000" cy="228600"/>
+            <a:chOff x="3657600" y="1600200"/>
+            <a:chExt cx="533400" cy="304800"/>
+          </a:xfrm>
+        </p:grpSpPr>
+        <p:sp>
+          <p:nvSpPr>
+            <p:cNvPr id="16" name="Rounded Rectangle 15"/>
+            <p:cNvSpPr/>
+            <p:nvPr/>
+          </p:nvSpPr>
+          <p:spPr>
+            <a:xfrm>
+              <a:off x="3657600" y="1600200"/>
+              <a:ext cx="533400" cy="304800"/>
+            </a:xfrm>
+            <a:prstGeom prst="roundRect">
+              <a:avLst/>
+            </a:prstGeom>
+            <a:noFill/>
+            <a:ln w="12700">
+              <a:solidFill>
+                <a:srgbClr val="FF0000"/>
+              </a:solidFill>
+            </a:ln>
+          </p:spPr>
+          <p:style>
+            <a:lnRef idx="2">
+              <a:schemeClr val="accent1">
+                <a:shade val="50000"/>
+              </a:schemeClr>
+            </a:lnRef>
+            <a:fillRef idx="1">
+              <a:schemeClr val="accent1"/>
+            </a:fillRef>
+            <a:effectRef idx="0">
+              <a:schemeClr val="accent1"/>
+            </a:effectRef>
+            <a:fontRef idx="minor">
+              <a:schemeClr val="lt1"/>
+            </a:fontRef>
+          </p:style>
+          <p:txBody>
+            <a:bodyPr rtlCol="0" anchor="ctr"/>
+            <a:lstStyle/>
+            <a:p>
+              <a:pPr algn="ctr"/>
+              <a:endParaRPr lang="en-US"/>
+            </a:p>
+          </p:txBody>
+        </p:sp>
+        <p:cxnSp>
+          <p:nvCxnSpPr>
+            <p:cNvPr id="18" name="Straight Connector 17"/>
+            <p:cNvCxnSpPr/>
+            <p:nvPr/>
+          </p:nvCxnSpPr>
+          <p:spPr>
+            <a:xfrm rot="10800000" flipH="1">
+              <a:off x="3657600" y="1676400"/>
+              <a:ext cx="533400" cy="0"/>
+            </a:xfrm>
+            <a:prstGeom prst="line">
+              <a:avLst/>
+            </a:prstGeom>
+            <a:ln w="12700">
+              <a:solidFill>
+                <a:srgbClr val="FF0000"/>
+              </a:solidFill>
+            </a:ln>
+          </p:spPr>
+          <p:style>
+            <a:lnRef idx="1">
+              <a:schemeClr val="accent1"/>
+            </a:lnRef>
+            <a:fillRef idx="0">
+              <a:schemeClr val="accent1"/>
+            </a:fillRef>
+            <a:effectRef idx="0">
+              <a:schemeClr val="accent1"/>
+            </a:effectRef>
+            <a:fontRef idx="minor">
+              <a:schemeClr val="tx1"/>
+            </a:fontRef>
+          </p:style>
+        </p:cxnSp>
+      </p:grpSp>
+    </p:spTree>
+  </p:cSld>
+  <p:clrMapOvr>
+    <a:masterClrMapping/>
+  </p:clrMapOvr>
+</p:sld>
+</file>
+
 <file path=ppt/theme/theme1.xml><?xml version="1.0" encoding="utf-8"?>
 <a:theme xmlns:a="http://schemas.openxmlformats.org/drawingml/2006/main" name="Office Theme">
   <a:themeElements>

</xml_diff>